<commit_message>
preparing for scans with COMSOL data
</commit_message>
<xml_diff>
--- a/presentations/DESY - Week 5.pptx
+++ b/presentations/DESY - Week 5.pptx
@@ -8,6 +8,7 @@
     <p:sldId id="257" r:id="rId2"/>
     <p:sldId id="258" r:id="rId3"/>
     <p:sldId id="259" r:id="rId4"/>
+    <p:sldId id="260" r:id="rId5"/>
   </p:sldIdLst>
   <p:sldSz cx="12192000" cy="6858000"/>
   <p:notesSz cx="6858000" cy="9144000"/>
@@ -263,7 +264,7 @@
           <a:p>
             <a:fld id="{76232585-0F90-4944-BD2B-BEDB9D0724CB}" type="datetimeFigureOut">
               <a:rPr lang="en-GB" smtClean="0"/>
-              <a:t>13/08/2023</a:t>
+              <a:t>14/08/2023</a:t>
             </a:fld>
             <a:endParaRPr lang="en-GB"/>
           </a:p>
@@ -463,7 +464,7 @@
           <a:p>
             <a:fld id="{76232585-0F90-4944-BD2B-BEDB9D0724CB}" type="datetimeFigureOut">
               <a:rPr lang="en-GB" smtClean="0"/>
-              <a:t>13/08/2023</a:t>
+              <a:t>14/08/2023</a:t>
             </a:fld>
             <a:endParaRPr lang="en-GB"/>
           </a:p>
@@ -673,7 +674,7 @@
           <a:p>
             <a:fld id="{76232585-0F90-4944-BD2B-BEDB9D0724CB}" type="datetimeFigureOut">
               <a:rPr lang="en-GB" smtClean="0"/>
-              <a:t>13/08/2023</a:t>
+              <a:t>14/08/2023</a:t>
             </a:fld>
             <a:endParaRPr lang="en-GB"/>
           </a:p>
@@ -873,7 +874,7 @@
           <a:p>
             <a:fld id="{76232585-0F90-4944-BD2B-BEDB9D0724CB}" type="datetimeFigureOut">
               <a:rPr lang="en-GB" smtClean="0"/>
-              <a:t>13/08/2023</a:t>
+              <a:t>14/08/2023</a:t>
             </a:fld>
             <a:endParaRPr lang="en-GB"/>
           </a:p>
@@ -1149,7 +1150,7 @@
           <a:p>
             <a:fld id="{76232585-0F90-4944-BD2B-BEDB9D0724CB}" type="datetimeFigureOut">
               <a:rPr lang="en-GB" smtClean="0"/>
-              <a:t>13/08/2023</a:t>
+              <a:t>14/08/2023</a:t>
             </a:fld>
             <a:endParaRPr lang="en-GB"/>
           </a:p>
@@ -1417,7 +1418,7 @@
           <a:p>
             <a:fld id="{76232585-0F90-4944-BD2B-BEDB9D0724CB}" type="datetimeFigureOut">
               <a:rPr lang="en-GB" smtClean="0"/>
-              <a:t>13/08/2023</a:t>
+              <a:t>14/08/2023</a:t>
             </a:fld>
             <a:endParaRPr lang="en-GB"/>
           </a:p>
@@ -1832,7 +1833,7 @@
           <a:p>
             <a:fld id="{76232585-0F90-4944-BD2B-BEDB9D0724CB}" type="datetimeFigureOut">
               <a:rPr lang="en-GB" smtClean="0"/>
-              <a:t>13/08/2023</a:t>
+              <a:t>14/08/2023</a:t>
             </a:fld>
             <a:endParaRPr lang="en-GB"/>
           </a:p>
@@ -1974,7 +1975,7 @@
           <a:p>
             <a:fld id="{76232585-0F90-4944-BD2B-BEDB9D0724CB}" type="datetimeFigureOut">
               <a:rPr lang="en-GB" smtClean="0"/>
-              <a:t>13/08/2023</a:t>
+              <a:t>14/08/2023</a:t>
             </a:fld>
             <a:endParaRPr lang="en-GB"/>
           </a:p>
@@ -2087,7 +2088,7 @@
           <a:p>
             <a:fld id="{76232585-0F90-4944-BD2B-BEDB9D0724CB}" type="datetimeFigureOut">
               <a:rPr lang="en-GB" smtClean="0"/>
-              <a:t>13/08/2023</a:t>
+              <a:t>14/08/2023</a:t>
             </a:fld>
             <a:endParaRPr lang="en-GB"/>
           </a:p>
@@ -2400,7 +2401,7 @@
           <a:p>
             <a:fld id="{76232585-0F90-4944-BD2B-BEDB9D0724CB}" type="datetimeFigureOut">
               <a:rPr lang="en-GB" smtClean="0"/>
-              <a:t>13/08/2023</a:t>
+              <a:t>14/08/2023</a:t>
             </a:fld>
             <a:endParaRPr lang="en-GB"/>
           </a:p>
@@ -2689,7 +2690,7 @@
           <a:p>
             <a:fld id="{76232585-0F90-4944-BD2B-BEDB9D0724CB}" type="datetimeFigureOut">
               <a:rPr lang="en-GB" smtClean="0"/>
-              <a:t>13/08/2023</a:t>
+              <a:t>14/08/2023</a:t>
             </a:fld>
             <a:endParaRPr lang="en-GB"/>
           </a:p>
@@ -2932,7 +2933,7 @@
           <a:p>
             <a:fld id="{76232585-0F90-4944-BD2B-BEDB9D0724CB}" type="datetimeFigureOut">
               <a:rPr lang="en-GB" smtClean="0"/>
-              <a:t>13/08/2023</a:t>
+              <a:t>14/08/2023</a:t>
             </a:fld>
             <a:endParaRPr lang="en-GB"/>
           </a:p>
@@ -4309,6 +4310,94 @@
 </p:sld>
 </file>
 
+<file path=ppt/slides/slide4.xml><?xml version="1.0" encoding="utf-8"?>
+<p:sld xmlns:a="http://schemas.openxmlformats.org/drawingml/2006/main" xmlns:r="http://schemas.openxmlformats.org/officeDocument/2006/relationships" xmlns:p="http://schemas.openxmlformats.org/presentationml/2006/main">
+  <p:cSld>
+    <p:spTree>
+      <p:nvGrpSpPr>
+        <p:cNvPr id="1" name=""/>
+        <p:cNvGrpSpPr/>
+        <p:nvPr/>
+      </p:nvGrpSpPr>
+      <p:grpSpPr>
+        <a:xfrm>
+          <a:off x="0" y="0"/>
+          <a:ext cx="0" cy="0"/>
+          <a:chOff x="0" y="0"/>
+          <a:chExt cx="0" cy="0"/>
+        </a:xfrm>
+      </p:grpSpPr>
+      <p:sp>
+        <p:nvSpPr>
+          <p:cNvPr id="2" name="Title 1">
+            <a:extLst>
+              <a:ext uri="{FF2B5EF4-FFF2-40B4-BE49-F238E27FC236}">
+                <a16:creationId xmlns:a16="http://schemas.microsoft.com/office/drawing/2014/main" id="{E6D10441-6128-B3DF-403A-DFC8AA62A07C}"/>
+              </a:ext>
+            </a:extLst>
+          </p:cNvPr>
+          <p:cNvSpPr>
+            <a:spLocks noGrp="1"/>
+          </p:cNvSpPr>
+          <p:nvPr>
+            <p:ph type="title"/>
+          </p:nvPr>
+        </p:nvSpPr>
+        <p:spPr/>
+        <p:txBody>
+          <a:bodyPr/>
+          <a:lstStyle/>
+          <a:p>
+            <a:r>
+              <a:rPr lang="en-GB" b="1" dirty="0">
+                <a:solidFill>
+                  <a:srgbClr val="002060"/>
+                </a:solidFill>
+              </a:rPr>
+              <a:t>Comparison of different gases</a:t>
+            </a:r>
+            <a:endParaRPr lang="en-GB" dirty="0"/>
+          </a:p>
+        </p:txBody>
+      </p:sp>
+      <p:sp>
+        <p:nvSpPr>
+          <p:cNvPr id="3" name="Content Placeholder 2">
+            <a:extLst>
+              <a:ext uri="{FF2B5EF4-FFF2-40B4-BE49-F238E27FC236}">
+                <a16:creationId xmlns:a16="http://schemas.microsoft.com/office/drawing/2014/main" id="{534048CD-97BE-691A-1B5D-98C2DAD0252F}"/>
+              </a:ext>
+            </a:extLst>
+          </p:cNvPr>
+          <p:cNvSpPr>
+            <a:spLocks noGrp="1"/>
+          </p:cNvSpPr>
+          <p:nvPr>
+            <p:ph idx="1"/>
+          </p:nvPr>
+        </p:nvSpPr>
+        <p:spPr/>
+        <p:txBody>
+          <a:bodyPr/>
+          <a:lstStyle/>
+          <a:p>
+            <a:endParaRPr lang="en-GB" dirty="0"/>
+          </a:p>
+        </p:txBody>
+      </p:sp>
+    </p:spTree>
+    <p:extLst>
+      <p:ext uri="{BB962C8B-B14F-4D97-AF65-F5344CB8AC3E}">
+        <p14:creationId xmlns:p14="http://schemas.microsoft.com/office/powerpoint/2010/main" val="3223392986"/>
+      </p:ext>
+    </p:extLst>
+  </p:cSld>
+  <p:clrMapOvr>
+    <a:masterClrMapping/>
+  </p:clrMapOvr>
+</p:sld>
+</file>
+
 <file path=ppt/theme/theme1.xml><?xml version="1.0" encoding="utf-8"?>
 <a:theme xmlns:a="http://schemas.openxmlformats.org/drawingml/2006/main" name="Office Theme">
   <a:themeElements>

</xml_diff>

<commit_message>
code for scan_eval essentially finished
</commit_message>
<xml_diff>
--- a/presentations/DESY - Week 5.pptx
+++ b/presentations/DESY - Week 5.pptx
@@ -10,10 +10,11 @@
     <p:sldId id="265" r:id="rId4"/>
     <p:sldId id="262" r:id="rId5"/>
     <p:sldId id="263" r:id="rId6"/>
-    <p:sldId id="264" r:id="rId7"/>
-    <p:sldId id="260" r:id="rId8"/>
-    <p:sldId id="258" r:id="rId9"/>
-    <p:sldId id="259" r:id="rId10"/>
+    <p:sldId id="266" r:id="rId7"/>
+    <p:sldId id="264" r:id="rId8"/>
+    <p:sldId id="260" r:id="rId9"/>
+    <p:sldId id="258" r:id="rId10"/>
+    <p:sldId id="259" r:id="rId11"/>
   </p:sldIdLst>
   <p:sldSz cx="12192000" cy="6858000"/>
   <p:notesSz cx="6858000" cy="9144000"/>
@@ -3463,6 +3464,192 @@
 </p:sld>
 </file>
 
+<file path=ppt/slides/slide10.xml><?xml version="1.0" encoding="utf-8"?>
+<p:sld xmlns:a="http://schemas.openxmlformats.org/drawingml/2006/main" xmlns:r="http://schemas.openxmlformats.org/officeDocument/2006/relationships" xmlns:p="http://schemas.openxmlformats.org/presentationml/2006/main" show="0">
+  <p:cSld>
+    <p:spTree>
+      <p:nvGrpSpPr>
+        <p:cNvPr id="1" name=""/>
+        <p:cNvGrpSpPr/>
+        <p:nvPr/>
+      </p:nvGrpSpPr>
+      <p:grpSpPr>
+        <a:xfrm>
+          <a:off x="0" y="0"/>
+          <a:ext cx="0" cy="0"/>
+          <a:chOff x="0" y="0"/>
+          <a:chExt cx="0" cy="0"/>
+        </a:xfrm>
+      </p:grpSpPr>
+      <p:sp>
+        <p:nvSpPr>
+          <p:cNvPr id="2" name="Title 1">
+            <a:extLst>
+              <a:ext uri="{FF2B5EF4-FFF2-40B4-BE49-F238E27FC236}">
+                <a16:creationId xmlns:a16="http://schemas.microsoft.com/office/drawing/2014/main" id="{B6615C61-A890-9780-3C3E-6C9923A22904}"/>
+              </a:ext>
+            </a:extLst>
+          </p:cNvPr>
+          <p:cNvSpPr>
+            <a:spLocks noGrp="1"/>
+          </p:cNvSpPr>
+          <p:nvPr>
+            <p:ph type="title"/>
+          </p:nvPr>
+        </p:nvSpPr>
+        <p:spPr/>
+        <p:txBody>
+          <a:bodyPr/>
+          <a:lstStyle/>
+          <a:p>
+            <a:r>
+              <a:rPr lang="en-GB" b="1" dirty="0">
+                <a:solidFill>
+                  <a:srgbClr val="002060"/>
+                </a:solidFill>
+              </a:rPr>
+              <a:t>Comparison of different gases [OLD]</a:t>
+            </a:r>
+          </a:p>
+        </p:txBody>
+      </p:sp>
+      <p:sp>
+        <p:nvSpPr>
+          <p:cNvPr id="4" name="Content Placeholder 3">
+            <a:extLst>
+              <a:ext uri="{FF2B5EF4-FFF2-40B4-BE49-F238E27FC236}">
+                <a16:creationId xmlns:a16="http://schemas.microsoft.com/office/drawing/2014/main" id="{BD23AE31-E6EB-7576-C45D-D0D8C7B8F8C3}"/>
+              </a:ext>
+            </a:extLst>
+          </p:cNvPr>
+          <p:cNvSpPr>
+            <a:spLocks noGrp="1"/>
+          </p:cNvSpPr>
+          <p:nvPr>
+            <p:ph idx="1"/>
+          </p:nvPr>
+        </p:nvSpPr>
+        <p:spPr>
+          <a:xfrm>
+            <a:off x="838200" y="1825624"/>
+            <a:ext cx="5450633" cy="4828042"/>
+          </a:xfrm>
+        </p:spPr>
+        <p:txBody>
+          <a:bodyPr>
+            <a:normAutofit lnSpcReduction="10000"/>
+          </a:bodyPr>
+          <a:lstStyle/>
+          <a:p>
+            <a:r>
+              <a:rPr lang="en-GB" dirty="0"/>
+              <a:t>At the given parameter values, the highest UV energies are generated by krypton, argon and nitrous oxide </a:t>
+            </a:r>
+          </a:p>
+          <a:p>
+            <a:pPr lvl="1">
+              <a:buFont typeface="Wingdings" panose="05000000000000000000" pitchFamily="2" charset="2"/>
+              <a:buChar char="Ø"/>
+            </a:pPr>
+            <a:r>
+              <a:rPr lang="en-GB" dirty="0"/>
+              <a:t> </a:t>
+            </a:r>
+            <a:r>
+              <a:rPr lang="en-GB" i="1" dirty="0">
+                <a:solidFill>
+                  <a:srgbClr val="002060"/>
+                </a:solidFill>
+              </a:rPr>
+              <a:t>Investigate Kr and N2O in more detail (plots on </a:t>
+            </a:r>
+            <a:r>
+              <a:rPr lang="en-GB" i="1" dirty="0" err="1">
+                <a:solidFill>
+                  <a:srgbClr val="002060"/>
+                </a:solidFill>
+              </a:rPr>
+              <a:t>Sync&amp;Share</a:t>
+            </a:r>
+            <a:r>
+              <a:rPr lang="en-GB" i="1" dirty="0">
+                <a:solidFill>
+                  <a:srgbClr val="002060"/>
+                </a:solidFill>
+              </a:rPr>
+              <a:t>)?</a:t>
+            </a:r>
+          </a:p>
+          <a:p>
+            <a:r>
+              <a:rPr lang="en-GB" dirty="0"/>
+              <a:t>Neon, on the other hand, yields the second-lowest UV energy</a:t>
+            </a:r>
+          </a:p>
+          <a:p>
+            <a:r>
+              <a:rPr lang="en-GB" i="1" dirty="0">
+                <a:solidFill>
+                  <a:srgbClr val="002060"/>
+                </a:solidFill>
+              </a:rPr>
+              <a:t>Note that relative gas performance is likely sensitive to central gas pressure and beam power: simulations should be extended!</a:t>
+            </a:r>
+          </a:p>
+          <a:p>
+            <a:endParaRPr lang="en-GB" dirty="0"/>
+          </a:p>
+        </p:txBody>
+      </p:sp>
+      <p:pic>
+        <p:nvPicPr>
+          <p:cNvPr id="7" name="Picture 6" descr="A blue and white graph&#10;&#10;Description automatically generated">
+            <a:extLst>
+              <a:ext uri="{FF2B5EF4-FFF2-40B4-BE49-F238E27FC236}">
+                <a16:creationId xmlns:a16="http://schemas.microsoft.com/office/drawing/2014/main" id="{1F4B2AD0-C574-3CED-D35E-B7AEB8A7C3C7}"/>
+              </a:ext>
+            </a:extLst>
+          </p:cNvPr>
+          <p:cNvPicPr>
+            <a:picLocks noChangeAspect="1"/>
+          </p:cNvPicPr>
+          <p:nvPr/>
+        </p:nvPicPr>
+        <p:blipFill>
+          <a:blip r:embed="rId2">
+            <a:extLst>
+              <a:ext uri="{28A0092B-C50C-407E-A947-70E740481C1C}">
+                <a14:useLocalDpi xmlns:a14="http://schemas.microsoft.com/office/drawing/2010/main" val="0"/>
+              </a:ext>
+            </a:extLst>
+          </a:blip>
+          <a:stretch>
+            <a:fillRect/>
+          </a:stretch>
+        </p:blipFill>
+        <p:spPr>
+          <a:xfrm>
+            <a:off x="6208333" y="1348921"/>
+            <a:ext cx="6437389" cy="4828042"/>
+          </a:xfrm>
+          <a:prstGeom prst="rect">
+            <a:avLst/>
+          </a:prstGeom>
+        </p:spPr>
+      </p:pic>
+    </p:spTree>
+    <p:extLst>
+      <p:ext uri="{BB962C8B-B14F-4D97-AF65-F5344CB8AC3E}">
+        <p14:creationId xmlns:p14="http://schemas.microsoft.com/office/powerpoint/2010/main" val="4012426225"/>
+      </p:ext>
+    </p:extLst>
+  </p:cSld>
+  <p:clrMapOvr>
+    <a:masterClrMapping/>
+  </p:clrMapOvr>
+</p:sld>
+</file>
+
 <file path=ppt/slides/slide2.xml><?xml version="1.0" encoding="utf-8"?>
 <p:sld xmlns:a="http://schemas.openxmlformats.org/drawingml/2006/main" xmlns:r="http://schemas.openxmlformats.org/officeDocument/2006/relationships" xmlns:p="http://schemas.openxmlformats.org/presentationml/2006/main">
   <p:cSld>
@@ -3741,6 +3928,13 @@
             <a:r>
               <a:rPr lang="en-GB" dirty="0"/>
               <a:t>Compare the COMSOL density model to the gradient density model and decide which one to use moving forward </a:t>
+            </a:r>
+          </a:p>
+          <a:p>
+            <a:pPr lvl="1"/>
+            <a:r>
+              <a:rPr lang="en-GB" dirty="0"/>
+              <a:t>SURELY COMSOL SHOULD BE TAKEN AS BEING MORE ACCURATE???</a:t>
             </a:r>
           </a:p>
           <a:p>
@@ -4103,6 +4297,110 @@
           <a:chExt cx="0" cy="0"/>
         </a:xfrm>
       </p:grpSpPr>
+      <p:sp>
+        <p:nvSpPr>
+          <p:cNvPr id="2" name="Title 1">
+            <a:extLst>
+              <a:ext uri="{FF2B5EF4-FFF2-40B4-BE49-F238E27FC236}">
+                <a16:creationId xmlns:a16="http://schemas.microsoft.com/office/drawing/2014/main" id="{ADBE7A8F-D5BA-BB68-3CE7-3653A8A2B707}"/>
+              </a:ext>
+            </a:extLst>
+          </p:cNvPr>
+          <p:cNvSpPr>
+            <a:spLocks noGrp="1"/>
+          </p:cNvSpPr>
+          <p:nvPr>
+            <p:ph type="title"/>
+          </p:nvPr>
+        </p:nvSpPr>
+        <p:spPr/>
+        <p:txBody>
+          <a:bodyPr/>
+          <a:lstStyle/>
+          <a:p>
+            <a:endParaRPr lang="en-GB"/>
+          </a:p>
+        </p:txBody>
+      </p:sp>
+      <p:sp>
+        <p:nvSpPr>
+          <p:cNvPr id="3" name="Content Placeholder 2">
+            <a:extLst>
+              <a:ext uri="{FF2B5EF4-FFF2-40B4-BE49-F238E27FC236}">
+                <a16:creationId xmlns:a16="http://schemas.microsoft.com/office/drawing/2014/main" id="{7B2E57CC-0269-055C-2EE7-9433A3F0AD2F}"/>
+              </a:ext>
+            </a:extLst>
+          </p:cNvPr>
+          <p:cNvSpPr>
+            <a:spLocks noGrp="1"/>
+          </p:cNvSpPr>
+          <p:nvPr>
+            <p:ph idx="1"/>
+          </p:nvPr>
+        </p:nvSpPr>
+        <p:spPr/>
+        <p:txBody>
+          <a:bodyPr/>
+          <a:lstStyle/>
+          <a:p>
+            <a:r>
+              <a:rPr lang="en-GB" dirty="0"/>
+              <a:t>General trend: shortest pulses occur for very low pressures and hence very low UV energies</a:t>
+            </a:r>
+          </a:p>
+          <a:p>
+            <a:endParaRPr lang="en-GB" dirty="0"/>
+          </a:p>
+          <a:p>
+            <a:endParaRPr lang="en-GB" dirty="0"/>
+          </a:p>
+          <a:p>
+            <a:r>
+              <a:rPr lang="en-GB" dirty="0"/>
+              <a:t>Identify main differences between COMSOL and grad models </a:t>
+            </a:r>
+          </a:p>
+          <a:p>
+            <a:endParaRPr lang="en-GB" dirty="0"/>
+          </a:p>
+          <a:p>
+            <a:r>
+              <a:rPr lang="en-GB" dirty="0"/>
+              <a:t>Then also look at spectra [just nit pick individual case]</a:t>
+            </a:r>
+          </a:p>
+        </p:txBody>
+      </p:sp>
+    </p:spTree>
+    <p:extLst>
+      <p:ext uri="{BB962C8B-B14F-4D97-AF65-F5344CB8AC3E}">
+        <p14:creationId xmlns:p14="http://schemas.microsoft.com/office/powerpoint/2010/main" val="2678057553"/>
+      </p:ext>
+    </p:extLst>
+  </p:cSld>
+  <p:clrMapOvr>
+    <a:masterClrMapping/>
+  </p:clrMapOvr>
+</p:sld>
+</file>
+
+<file path=ppt/slides/slide7.xml><?xml version="1.0" encoding="utf-8"?>
+<p:sld xmlns:a="http://schemas.openxmlformats.org/drawingml/2006/main" xmlns:r="http://schemas.openxmlformats.org/officeDocument/2006/relationships" xmlns:p="http://schemas.openxmlformats.org/presentationml/2006/main">
+  <p:cSld>
+    <p:spTree>
+      <p:nvGrpSpPr>
+        <p:cNvPr id="1" name=""/>
+        <p:cNvGrpSpPr/>
+        <p:nvPr/>
+      </p:nvGrpSpPr>
+      <p:grpSpPr>
+        <a:xfrm>
+          <a:off x="0" y="0"/>
+          <a:ext cx="0" cy="0"/>
+          <a:chOff x="0" y="0"/>
+          <a:chExt cx="0" cy="0"/>
+        </a:xfrm>
+      </p:grpSpPr>
       <p:pic>
         <p:nvPicPr>
           <p:cNvPr id="4" name="Picture 3" descr="A graph with orange lines&#10;&#10;Description automatically generated">
@@ -4308,7 +4606,7 @@
 </p:sld>
 </file>
 
-<file path=ppt/slides/slide7.xml><?xml version="1.0" encoding="utf-8"?>
+<file path=ppt/slides/slide8.xml><?xml version="1.0" encoding="utf-8"?>
 <p:sld xmlns:a="http://schemas.openxmlformats.org/drawingml/2006/main" xmlns:r="http://schemas.openxmlformats.org/officeDocument/2006/relationships" xmlns:p="http://schemas.openxmlformats.org/presentationml/2006/main">
   <p:cSld>
     <p:spTree>
@@ -4396,7 +4694,7 @@
 </p:sld>
 </file>
 
-<file path=ppt/slides/slide8.xml><?xml version="1.0" encoding="utf-8"?>
+<file path=ppt/slides/slide9.xml><?xml version="1.0" encoding="utf-8"?>
 <p:sld xmlns:a="http://schemas.openxmlformats.org/drawingml/2006/main" xmlns:r="http://schemas.openxmlformats.org/officeDocument/2006/relationships" xmlns:p="http://schemas.openxmlformats.org/presentationml/2006/main" show="0">
   <p:cSld>
     <p:spTree>
@@ -5062,192 +5360,6 @@
 </p:sld>
 </file>
 
-<file path=ppt/slides/slide9.xml><?xml version="1.0" encoding="utf-8"?>
-<p:sld xmlns:a="http://schemas.openxmlformats.org/drawingml/2006/main" xmlns:r="http://schemas.openxmlformats.org/officeDocument/2006/relationships" xmlns:p="http://schemas.openxmlformats.org/presentationml/2006/main" show="0">
-  <p:cSld>
-    <p:spTree>
-      <p:nvGrpSpPr>
-        <p:cNvPr id="1" name=""/>
-        <p:cNvGrpSpPr/>
-        <p:nvPr/>
-      </p:nvGrpSpPr>
-      <p:grpSpPr>
-        <a:xfrm>
-          <a:off x="0" y="0"/>
-          <a:ext cx="0" cy="0"/>
-          <a:chOff x="0" y="0"/>
-          <a:chExt cx="0" cy="0"/>
-        </a:xfrm>
-      </p:grpSpPr>
-      <p:sp>
-        <p:nvSpPr>
-          <p:cNvPr id="2" name="Title 1">
-            <a:extLst>
-              <a:ext uri="{FF2B5EF4-FFF2-40B4-BE49-F238E27FC236}">
-                <a16:creationId xmlns:a16="http://schemas.microsoft.com/office/drawing/2014/main" id="{B6615C61-A890-9780-3C3E-6C9923A22904}"/>
-              </a:ext>
-            </a:extLst>
-          </p:cNvPr>
-          <p:cNvSpPr>
-            <a:spLocks noGrp="1"/>
-          </p:cNvSpPr>
-          <p:nvPr>
-            <p:ph type="title"/>
-          </p:nvPr>
-        </p:nvSpPr>
-        <p:spPr/>
-        <p:txBody>
-          <a:bodyPr/>
-          <a:lstStyle/>
-          <a:p>
-            <a:r>
-              <a:rPr lang="en-GB" b="1" dirty="0">
-                <a:solidFill>
-                  <a:srgbClr val="002060"/>
-                </a:solidFill>
-              </a:rPr>
-              <a:t>Comparison of different gases [OLD]</a:t>
-            </a:r>
-          </a:p>
-        </p:txBody>
-      </p:sp>
-      <p:sp>
-        <p:nvSpPr>
-          <p:cNvPr id="4" name="Content Placeholder 3">
-            <a:extLst>
-              <a:ext uri="{FF2B5EF4-FFF2-40B4-BE49-F238E27FC236}">
-                <a16:creationId xmlns:a16="http://schemas.microsoft.com/office/drawing/2014/main" id="{BD23AE31-E6EB-7576-C45D-D0D8C7B8F8C3}"/>
-              </a:ext>
-            </a:extLst>
-          </p:cNvPr>
-          <p:cNvSpPr>
-            <a:spLocks noGrp="1"/>
-          </p:cNvSpPr>
-          <p:nvPr>
-            <p:ph idx="1"/>
-          </p:nvPr>
-        </p:nvSpPr>
-        <p:spPr>
-          <a:xfrm>
-            <a:off x="838200" y="1825624"/>
-            <a:ext cx="5450633" cy="4828042"/>
-          </a:xfrm>
-        </p:spPr>
-        <p:txBody>
-          <a:bodyPr>
-            <a:normAutofit lnSpcReduction="10000"/>
-          </a:bodyPr>
-          <a:lstStyle/>
-          <a:p>
-            <a:r>
-              <a:rPr lang="en-GB" dirty="0"/>
-              <a:t>At the given parameter values, the highest UV energies are generated by krypton, argon and nitrous oxide </a:t>
-            </a:r>
-          </a:p>
-          <a:p>
-            <a:pPr lvl="1">
-              <a:buFont typeface="Wingdings" panose="05000000000000000000" pitchFamily="2" charset="2"/>
-              <a:buChar char="Ø"/>
-            </a:pPr>
-            <a:r>
-              <a:rPr lang="en-GB" dirty="0"/>
-              <a:t> </a:t>
-            </a:r>
-            <a:r>
-              <a:rPr lang="en-GB" i="1" dirty="0">
-                <a:solidFill>
-                  <a:srgbClr val="002060"/>
-                </a:solidFill>
-              </a:rPr>
-              <a:t>Investigate Kr and N2O in more detail (plots on </a:t>
-            </a:r>
-            <a:r>
-              <a:rPr lang="en-GB" i="1" dirty="0" err="1">
-                <a:solidFill>
-                  <a:srgbClr val="002060"/>
-                </a:solidFill>
-              </a:rPr>
-              <a:t>Sync&amp;Share</a:t>
-            </a:r>
-            <a:r>
-              <a:rPr lang="en-GB" i="1" dirty="0">
-                <a:solidFill>
-                  <a:srgbClr val="002060"/>
-                </a:solidFill>
-              </a:rPr>
-              <a:t>)?</a:t>
-            </a:r>
-          </a:p>
-          <a:p>
-            <a:r>
-              <a:rPr lang="en-GB" dirty="0"/>
-              <a:t>Neon, on the other hand, yields the second-lowest UV energy</a:t>
-            </a:r>
-          </a:p>
-          <a:p>
-            <a:r>
-              <a:rPr lang="en-GB" i="1" dirty="0">
-                <a:solidFill>
-                  <a:srgbClr val="002060"/>
-                </a:solidFill>
-              </a:rPr>
-              <a:t>Note that relative gas performance is likely sensitive to central gas pressure and beam power: simulations should be extended!</a:t>
-            </a:r>
-          </a:p>
-          <a:p>
-            <a:endParaRPr lang="en-GB" dirty="0"/>
-          </a:p>
-        </p:txBody>
-      </p:sp>
-      <p:pic>
-        <p:nvPicPr>
-          <p:cNvPr id="7" name="Picture 6" descr="A blue and white graph&#10;&#10;Description automatically generated">
-            <a:extLst>
-              <a:ext uri="{FF2B5EF4-FFF2-40B4-BE49-F238E27FC236}">
-                <a16:creationId xmlns:a16="http://schemas.microsoft.com/office/drawing/2014/main" id="{1F4B2AD0-C574-3CED-D35E-B7AEB8A7C3C7}"/>
-              </a:ext>
-            </a:extLst>
-          </p:cNvPr>
-          <p:cNvPicPr>
-            <a:picLocks noChangeAspect="1"/>
-          </p:cNvPicPr>
-          <p:nvPr/>
-        </p:nvPicPr>
-        <p:blipFill>
-          <a:blip r:embed="rId2">
-            <a:extLst>
-              <a:ext uri="{28A0092B-C50C-407E-A947-70E740481C1C}">
-                <a14:useLocalDpi xmlns:a14="http://schemas.microsoft.com/office/drawing/2010/main" val="0"/>
-              </a:ext>
-            </a:extLst>
-          </a:blip>
-          <a:stretch>
-            <a:fillRect/>
-          </a:stretch>
-        </p:blipFill>
-        <p:spPr>
-          <a:xfrm>
-            <a:off x="6208333" y="1348921"/>
-            <a:ext cx="6437389" cy="4828042"/>
-          </a:xfrm>
-          <a:prstGeom prst="rect">
-            <a:avLst/>
-          </a:prstGeom>
-        </p:spPr>
-      </p:pic>
-    </p:spTree>
-    <p:extLst>
-      <p:ext uri="{BB962C8B-B14F-4D97-AF65-F5344CB8AC3E}">
-        <p14:creationId xmlns:p14="http://schemas.microsoft.com/office/powerpoint/2010/main" val="4012426225"/>
-      </p:ext>
-    </p:extLst>
-  </p:cSld>
-  <p:clrMapOvr>
-    <a:masterClrMapping/>
-  </p:clrMapOvr>
-</p:sld>
-</file>
-
 <file path=ppt/theme/theme1.xml><?xml version="1.0" encoding="utf-8"?>
 <a:theme xmlns:a="http://schemas.openxmlformats.org/drawingml/2006/main" name="Office Theme">
   <a:themeElements>

</xml_diff>